<commit_message>
new performance measurement for learning agent
</commit_message>
<xml_diff>
--- a/non-src/Presentation/relevance.pptx
+++ b/non-src/Presentation/relevance.pptx
@@ -194,7 +194,7 @@
           <a:p>
             <a:fld id="{D374BD28-B62A-4B4A-8C29-1CC5490DA60C}" type="datetimeFigureOut">
               <a:rPr lang="de-DE" smtClean="0"/>
-              <a:t>29.06.2015</a:t>
+              <a:t>30.06.2015</a:t>
             </a:fld>
             <a:endParaRPr lang="de-DE"/>
           </a:p>
@@ -1566,7 +1566,7 @@
           <a:p>
             <a:fld id="{00781EAF-5D38-4307-A880-116C3607676F}" type="datetime1">
               <a:rPr lang="de-DE" smtClean="0"/>
-              <a:t>29.06.2015</a:t>
+              <a:t>30.06.2015</a:t>
             </a:fld>
             <a:endParaRPr lang="de-DE"/>
           </a:p>
@@ -1735,7 +1735,7 @@
           <a:p>
             <a:fld id="{1644D97E-137F-4E35-8854-951126A2FD34}" type="datetime1">
               <a:rPr lang="de-DE" smtClean="0"/>
-              <a:t>29.06.2015</a:t>
+              <a:t>30.06.2015</a:t>
             </a:fld>
             <a:endParaRPr lang="de-DE"/>
           </a:p>
@@ -1914,7 +1914,7 @@
           <a:p>
             <a:fld id="{1CD1BA2D-A256-4537-9A28-EB7250D11B4D}" type="datetime1">
               <a:rPr lang="de-DE" smtClean="0"/>
-              <a:t>29.06.2015</a:t>
+              <a:t>30.06.2015</a:t>
             </a:fld>
             <a:endParaRPr lang="de-DE"/>
           </a:p>
@@ -2083,7 +2083,7 @@
           <a:p>
             <a:fld id="{9793C4F8-5022-4982-A1C7-60A909C93A6A}" type="datetime1">
               <a:rPr lang="de-DE" smtClean="0"/>
-              <a:t>29.06.2015</a:t>
+              <a:t>30.06.2015</a:t>
             </a:fld>
             <a:endParaRPr lang="de-DE"/>
           </a:p>
@@ -2328,7 +2328,7 @@
           <a:p>
             <a:fld id="{AFCF1B91-4B26-4443-8D5E-5C2C56F30BDC}" type="datetime1">
               <a:rPr lang="de-DE" smtClean="0"/>
-              <a:t>29.06.2015</a:t>
+              <a:t>30.06.2015</a:t>
             </a:fld>
             <a:endParaRPr lang="de-DE"/>
           </a:p>
@@ -2615,7 +2615,7 @@
           <a:p>
             <a:fld id="{D014C72B-3EC0-4082-842F-744569193D2C}" type="datetime1">
               <a:rPr lang="de-DE" smtClean="0"/>
-              <a:t>29.06.2015</a:t>
+              <a:t>30.06.2015</a:t>
             </a:fld>
             <a:endParaRPr lang="de-DE"/>
           </a:p>
@@ -3036,7 +3036,7 @@
           <a:p>
             <a:fld id="{BD22693E-1F5D-4B50-9EE3-550A3D2C1389}" type="datetime1">
               <a:rPr lang="de-DE" smtClean="0"/>
-              <a:t>29.06.2015</a:t>
+              <a:t>30.06.2015</a:t>
             </a:fld>
             <a:endParaRPr lang="de-DE"/>
           </a:p>
@@ -3153,7 +3153,7 @@
           <a:p>
             <a:fld id="{516356E6-FEEB-469C-8697-23A32CF94B86}" type="datetime1">
               <a:rPr lang="de-DE" smtClean="0"/>
-              <a:t>29.06.2015</a:t>
+              <a:t>30.06.2015</a:t>
             </a:fld>
             <a:endParaRPr lang="de-DE"/>
           </a:p>
@@ -3247,7 +3247,7 @@
           <a:p>
             <a:fld id="{5EFC906F-5234-4EBF-8CB2-56E8DDF4D3C1}" type="datetime1">
               <a:rPr lang="de-DE" smtClean="0"/>
-              <a:t>29.06.2015</a:t>
+              <a:t>30.06.2015</a:t>
             </a:fld>
             <a:endParaRPr lang="de-DE"/>
           </a:p>
@@ -3523,7 +3523,7 @@
           <a:p>
             <a:fld id="{031B132D-88A7-463D-82EA-397D1B6A6E70}" type="datetime1">
               <a:rPr lang="de-DE" smtClean="0"/>
-              <a:t>29.06.2015</a:t>
+              <a:t>30.06.2015</a:t>
             </a:fld>
             <a:endParaRPr lang="de-DE"/>
           </a:p>
@@ -3775,7 +3775,7 @@
           <a:p>
             <a:fld id="{8B0B5862-8595-4747-9E23-CDA439968017}" type="datetime1">
               <a:rPr lang="de-DE" smtClean="0"/>
-              <a:t>29.06.2015</a:t>
+              <a:t>30.06.2015</a:t>
             </a:fld>
             <a:endParaRPr lang="de-DE"/>
           </a:p>
@@ -3987,7 +3987,7 @@
           <a:p>
             <a:fld id="{7F50287E-193D-480B-B6E9-3208F1302D56}" type="datetime1">
               <a:rPr lang="de-DE" smtClean="0"/>
-              <a:t>29.06.2015</a:t>
+              <a:t>30.06.2015</a:t>
             </a:fld>
             <a:endParaRPr lang="de-DE"/>
           </a:p>
@@ -4709,7 +4709,7 @@
             <p:ph idx="1"/>
             <p:extLst>
               <p:ext uri="{D42A27DB-BD31-4B8C-83A1-F6EECF244321}">
-                <p14:modId xmlns:p14="http://schemas.microsoft.com/office/powerpoint/2010/main" val="2390360413"/>
+                <p14:modId xmlns:p14="http://schemas.microsoft.com/office/powerpoint/2010/main" val="988135334"/>
               </p:ext>
             </p:extLst>
           </p:nvPr>
@@ -5542,7 +5542,7 @@
                     <a:p>
                       <a:r>
                         <a:rPr lang="de-DE" dirty="0" smtClean="0"/>
-                        <a:t>3857</a:t>
+                        <a:t>4643</a:t>
                       </a:r>
                       <a:endParaRPr lang="de-DE" dirty="0"/>
                     </a:p>
@@ -5556,7 +5556,7 @@
                     <a:p>
                       <a:r>
                         <a:rPr lang="de-DE" dirty="0" smtClean="0"/>
-                        <a:t>5636</a:t>
+                        <a:t>4816</a:t>
                       </a:r>
                       <a:endParaRPr lang="de-DE" dirty="0"/>
                     </a:p>
@@ -5570,7 +5570,7 @@
                     <a:p>
                       <a:r>
                         <a:rPr lang="de-DE" dirty="0" smtClean="0"/>
-                        <a:t>426</a:t>
+                        <a:t>453</a:t>
                       </a:r>
                       <a:endParaRPr lang="de-DE" dirty="0"/>
                     </a:p>
@@ -5584,7 +5584,7 @@
                     <a:p>
                       <a:r>
                         <a:rPr lang="de-DE" dirty="0" smtClean="0"/>
-                        <a:t>-1573</a:t>
+                        <a:t>-598</a:t>
                       </a:r>
                       <a:endParaRPr lang="de-DE" dirty="0"/>
                     </a:p>

</xml_diff>